<commit_message>
fixed diagram; read data after relays
</commit_message>
<xml_diff>
--- a/docs/Thermo Assay V2 Diagrams.pptx
+++ b/docs/Thermo Assay V2 Diagrams.pptx
@@ -105,6 +105,11 @@
       </a:defRPr>
     </a:lvl9pPr>
   </p:defaultTextStyle>
+  <p:extLst>
+    <p:ext uri="{EFAFB233-063F-42B5-8137-9DF3F51BA10A}">
+      <p15:sldGuideLst xmlns:p15="http://schemas.microsoft.com/office/powerpoint/2012/main"/>
+    </p:ext>
+  </p:extLst>
 </p:presentation>
 </file>
 
@@ -255,7 +260,7 @@
           <a:p>
             <a:fld id="{204E7148-8D04-458F-B52F-6ED835371B9A}" type="datetimeFigureOut">
               <a:rPr lang="en-US" smtClean="0"/>
-              <a:t>9/2/2021</a:t>
+              <a:t>10/21/2022</a:t>
             </a:fld>
             <a:endParaRPr lang="en-US"/>
           </a:p>
@@ -453,7 +458,7 @@
           <a:p>
             <a:fld id="{204E7148-8D04-458F-B52F-6ED835371B9A}" type="datetimeFigureOut">
               <a:rPr lang="en-US" smtClean="0"/>
-              <a:t>9/2/2021</a:t>
+              <a:t>10/21/2022</a:t>
             </a:fld>
             <a:endParaRPr lang="en-US"/>
           </a:p>
@@ -661,7 +666,7 @@
           <a:p>
             <a:fld id="{204E7148-8D04-458F-B52F-6ED835371B9A}" type="datetimeFigureOut">
               <a:rPr lang="en-US" smtClean="0"/>
-              <a:t>9/2/2021</a:t>
+              <a:t>10/21/2022</a:t>
             </a:fld>
             <a:endParaRPr lang="en-US"/>
           </a:p>
@@ -859,7 +864,7 @@
           <a:p>
             <a:fld id="{204E7148-8D04-458F-B52F-6ED835371B9A}" type="datetimeFigureOut">
               <a:rPr lang="en-US" smtClean="0"/>
-              <a:t>9/2/2021</a:t>
+              <a:t>10/21/2022</a:t>
             </a:fld>
             <a:endParaRPr lang="en-US"/>
           </a:p>
@@ -1134,7 +1139,7 @@
           <a:p>
             <a:fld id="{204E7148-8D04-458F-B52F-6ED835371B9A}" type="datetimeFigureOut">
               <a:rPr lang="en-US" smtClean="0"/>
-              <a:t>9/2/2021</a:t>
+              <a:t>10/21/2022</a:t>
             </a:fld>
             <a:endParaRPr lang="en-US"/>
           </a:p>
@@ -1399,7 +1404,7 @@
           <a:p>
             <a:fld id="{204E7148-8D04-458F-B52F-6ED835371B9A}" type="datetimeFigureOut">
               <a:rPr lang="en-US" smtClean="0"/>
-              <a:t>9/2/2021</a:t>
+              <a:t>10/21/2022</a:t>
             </a:fld>
             <a:endParaRPr lang="en-US"/>
           </a:p>
@@ -1811,7 +1816,7 @@
           <a:p>
             <a:fld id="{204E7148-8D04-458F-B52F-6ED835371B9A}" type="datetimeFigureOut">
               <a:rPr lang="en-US" smtClean="0"/>
-              <a:t>9/2/2021</a:t>
+              <a:t>10/21/2022</a:t>
             </a:fld>
             <a:endParaRPr lang="en-US"/>
           </a:p>
@@ -1952,7 +1957,7 @@
           <a:p>
             <a:fld id="{204E7148-8D04-458F-B52F-6ED835371B9A}" type="datetimeFigureOut">
               <a:rPr lang="en-US" smtClean="0"/>
-              <a:t>9/2/2021</a:t>
+              <a:t>10/21/2022</a:t>
             </a:fld>
             <a:endParaRPr lang="en-US"/>
           </a:p>
@@ -2065,7 +2070,7 @@
           <a:p>
             <a:fld id="{204E7148-8D04-458F-B52F-6ED835371B9A}" type="datetimeFigureOut">
               <a:rPr lang="en-US" smtClean="0"/>
-              <a:t>9/2/2021</a:t>
+              <a:t>10/21/2022</a:t>
             </a:fld>
             <a:endParaRPr lang="en-US"/>
           </a:p>
@@ -2376,7 +2381,7 @@
           <a:p>
             <a:fld id="{204E7148-8D04-458F-B52F-6ED835371B9A}" type="datetimeFigureOut">
               <a:rPr lang="en-US" smtClean="0"/>
-              <a:t>9/2/2021</a:t>
+              <a:t>10/21/2022</a:t>
             </a:fld>
             <a:endParaRPr lang="en-US"/>
           </a:p>
@@ -2664,7 +2669,7 @@
           <a:p>
             <a:fld id="{204E7148-8D04-458F-B52F-6ED835371B9A}" type="datetimeFigureOut">
               <a:rPr lang="en-US" smtClean="0"/>
-              <a:t>9/2/2021</a:t>
+              <a:t>10/21/2022</a:t>
             </a:fld>
             <a:endParaRPr lang="en-US"/>
           </a:p>
@@ -2905,7 +2910,7 @@
           <a:p>
             <a:fld id="{204E7148-8D04-458F-B52F-6ED835371B9A}" type="datetimeFigureOut">
               <a:rPr lang="en-US" smtClean="0"/>
-              <a:t>9/2/2021</a:t>
+              <a:t>10/21/2022</a:t>
             </a:fld>
             <a:endParaRPr lang="en-US"/>
           </a:p>
@@ -5801,7 +5806,7 @@
         </p:nvCxnSpPr>
         <p:spPr>
           <a:xfrm>
-            <a:off x="9671233" y="4135581"/>
+            <a:off x="9507754" y="449700"/>
             <a:ext cx="814436" cy="0"/>
           </a:xfrm>
           <a:prstGeom prst="straightConnector1">

</xml_diff>

<commit_message>
Updated tubing and valves
</commit_message>
<xml_diff>
--- a/docs/Thermo Assay V2 Diagrams.pptx
+++ b/docs/Thermo Assay V2 Diagrams.pptx
@@ -260,7 +260,7 @@
           <a:p>
             <a:fld id="{204E7148-8D04-458F-B52F-6ED835371B9A}" type="datetimeFigureOut">
               <a:rPr lang="en-US" smtClean="0"/>
-              <a:t>10/21/2022</a:t>
+              <a:t>10/12/2024</a:t>
             </a:fld>
             <a:endParaRPr lang="en-US"/>
           </a:p>
@@ -458,7 +458,7 @@
           <a:p>
             <a:fld id="{204E7148-8D04-458F-B52F-6ED835371B9A}" type="datetimeFigureOut">
               <a:rPr lang="en-US" smtClean="0"/>
-              <a:t>10/21/2022</a:t>
+              <a:t>10/12/2024</a:t>
             </a:fld>
             <a:endParaRPr lang="en-US"/>
           </a:p>
@@ -666,7 +666,7 @@
           <a:p>
             <a:fld id="{204E7148-8D04-458F-B52F-6ED835371B9A}" type="datetimeFigureOut">
               <a:rPr lang="en-US" smtClean="0"/>
-              <a:t>10/21/2022</a:t>
+              <a:t>10/12/2024</a:t>
             </a:fld>
             <a:endParaRPr lang="en-US"/>
           </a:p>
@@ -864,7 +864,7 @@
           <a:p>
             <a:fld id="{204E7148-8D04-458F-B52F-6ED835371B9A}" type="datetimeFigureOut">
               <a:rPr lang="en-US" smtClean="0"/>
-              <a:t>10/21/2022</a:t>
+              <a:t>10/12/2024</a:t>
             </a:fld>
             <a:endParaRPr lang="en-US"/>
           </a:p>
@@ -1139,7 +1139,7 @@
           <a:p>
             <a:fld id="{204E7148-8D04-458F-B52F-6ED835371B9A}" type="datetimeFigureOut">
               <a:rPr lang="en-US" smtClean="0"/>
-              <a:t>10/21/2022</a:t>
+              <a:t>10/12/2024</a:t>
             </a:fld>
             <a:endParaRPr lang="en-US"/>
           </a:p>
@@ -1404,7 +1404,7 @@
           <a:p>
             <a:fld id="{204E7148-8D04-458F-B52F-6ED835371B9A}" type="datetimeFigureOut">
               <a:rPr lang="en-US" smtClean="0"/>
-              <a:t>10/21/2022</a:t>
+              <a:t>10/12/2024</a:t>
             </a:fld>
             <a:endParaRPr lang="en-US"/>
           </a:p>
@@ -1816,7 +1816,7 @@
           <a:p>
             <a:fld id="{204E7148-8D04-458F-B52F-6ED835371B9A}" type="datetimeFigureOut">
               <a:rPr lang="en-US" smtClean="0"/>
-              <a:t>10/21/2022</a:t>
+              <a:t>10/12/2024</a:t>
             </a:fld>
             <a:endParaRPr lang="en-US"/>
           </a:p>
@@ -1957,7 +1957,7 @@
           <a:p>
             <a:fld id="{204E7148-8D04-458F-B52F-6ED835371B9A}" type="datetimeFigureOut">
               <a:rPr lang="en-US" smtClean="0"/>
-              <a:t>10/21/2022</a:t>
+              <a:t>10/12/2024</a:t>
             </a:fld>
             <a:endParaRPr lang="en-US"/>
           </a:p>
@@ -2070,7 +2070,7 @@
           <a:p>
             <a:fld id="{204E7148-8D04-458F-B52F-6ED835371B9A}" type="datetimeFigureOut">
               <a:rPr lang="en-US" smtClean="0"/>
-              <a:t>10/21/2022</a:t>
+              <a:t>10/12/2024</a:t>
             </a:fld>
             <a:endParaRPr lang="en-US"/>
           </a:p>
@@ -2381,7 +2381,7 @@
           <a:p>
             <a:fld id="{204E7148-8D04-458F-B52F-6ED835371B9A}" type="datetimeFigureOut">
               <a:rPr lang="en-US" smtClean="0"/>
-              <a:t>10/21/2022</a:t>
+              <a:t>10/12/2024</a:t>
             </a:fld>
             <a:endParaRPr lang="en-US"/>
           </a:p>
@@ -2669,7 +2669,7 @@
           <a:p>
             <a:fld id="{204E7148-8D04-458F-B52F-6ED835371B9A}" type="datetimeFigureOut">
               <a:rPr lang="en-US" smtClean="0"/>
-              <a:t>10/21/2022</a:t>
+              <a:t>10/12/2024</a:t>
             </a:fld>
             <a:endParaRPr lang="en-US"/>
           </a:p>
@@ -2910,7 +2910,7 @@
           <a:p>
             <a:fld id="{204E7148-8D04-458F-B52F-6ED835371B9A}" type="datetimeFigureOut">
               <a:rPr lang="en-US" smtClean="0"/>
-              <a:t>10/21/2022</a:t>
+              <a:t>10/12/2024</a:t>
             </a:fld>
             <a:endParaRPr lang="en-US"/>
           </a:p>
@@ -4024,7 +4024,7 @@
         </p:nvSpPr>
         <p:spPr>
           <a:xfrm>
-            <a:off x="2060867" y="2975262"/>
+            <a:off x="2060867" y="3003837"/>
             <a:ext cx="1922317" cy="169718"/>
           </a:xfrm>
           <a:prstGeom prst="rect">
@@ -4079,6 +4079,11 @@
           <a:prstGeom prst="rect">
             <a:avLst/>
           </a:prstGeom>
+          <a:solidFill>
+            <a:schemeClr val="bg1">
+              <a:lumMod val="50000"/>
+            </a:schemeClr>
+          </a:solidFill>
         </p:spPr>
         <p:style>
           <a:lnRef idx="2">
@@ -4101,17 +4106,7 @@
           <a:lstStyle/>
           <a:p>
             <a:pPr algn="ctr"/>
-            <a:r>
-              <a:rPr lang="en-US" dirty="0"/>
-              <a:t>Behavior</a:t>
-            </a:r>
-          </a:p>
-          <a:p>
-            <a:pPr algn="ctr"/>
-            <a:r>
-              <a:rPr lang="en-US" dirty="0"/>
-              <a:t>box</a:t>
-            </a:r>
+            <a:endParaRPr lang="en-US" dirty="0"/>
           </a:p>
         </p:txBody>
       </p:sp>
@@ -4889,7 +4884,7 @@
                   <a:schemeClr val="tx1"/>
                 </a:solidFill>
               </a:rPr>
-              <a:t>T connector</a:t>
+              <a:t>Large Tee connector</a:t>
             </a:r>
           </a:p>
         </p:txBody>
@@ -4948,7 +4943,7 @@
                   <a:schemeClr val="tx1"/>
                 </a:solidFill>
               </a:rPr>
-              <a:t>T connector</a:t>
+              <a:t>Large Tee connector</a:t>
             </a:r>
           </a:p>
         </p:txBody>
@@ -5007,7 +5002,7 @@
                   <a:schemeClr val="tx1"/>
                 </a:solidFill>
               </a:rPr>
-              <a:t>T connector</a:t>
+              <a:t>Large Tee connector</a:t>
             </a:r>
           </a:p>
         </p:txBody>
@@ -5066,7 +5061,7 @@
                   <a:schemeClr val="tx1"/>
                 </a:solidFill>
               </a:rPr>
-              <a:t>T connector</a:t>
+              <a:t>Large Tee connector</a:t>
             </a:r>
           </a:p>
         </p:txBody>
@@ -5125,7 +5120,7 @@
                   <a:schemeClr val="tx1"/>
                 </a:solidFill>
               </a:rPr>
-              <a:t>Straight connector/reducer</a:t>
+              <a:t>Reducer</a:t>
             </a:r>
           </a:p>
         </p:txBody>
@@ -5380,7 +5375,7 @@
                   <a:schemeClr val="tx1"/>
                 </a:solidFill>
               </a:rPr>
-              <a:t>Straight connector/reducer</a:t>
+              <a:t>Reducer</a:t>
             </a:r>
           </a:p>
         </p:txBody>
@@ -5439,7 +5434,7 @@
                   <a:schemeClr val="tx1"/>
                 </a:solidFill>
               </a:rPr>
-              <a:t>Straight connector/reducer</a:t>
+              <a:t>Reducer</a:t>
             </a:r>
           </a:p>
         </p:txBody>
@@ -5498,7 +5493,7 @@
                   <a:schemeClr val="tx1"/>
                 </a:solidFill>
               </a:rPr>
-              <a:t>Straight connector/reducer</a:t>
+              <a:t>Reducer</a:t>
             </a:r>
           </a:p>
         </p:txBody>
@@ -5831,6 +5826,864 @@
           </a:fontRef>
         </p:style>
       </p:cxnSp>
+      <p:sp>
+        <p:nvSpPr>
+          <p:cNvPr id="2" name="Rectangle 1">
+            <a:extLst>
+              <a:ext uri="{FF2B5EF4-FFF2-40B4-BE49-F238E27FC236}">
+                <a16:creationId xmlns:a16="http://schemas.microsoft.com/office/drawing/2014/main" id="{3B6C6E17-2564-5521-B9F2-ACEF17D3EB43}"/>
+              </a:ext>
+            </a:extLst>
+          </p:cNvPr>
+          <p:cNvSpPr/>
+          <p:nvPr/>
+        </p:nvSpPr>
+        <p:spPr>
+          <a:xfrm>
+            <a:off x="561108" y="3015648"/>
+            <a:ext cx="1605395" cy="149941"/>
+          </a:xfrm>
+          <a:prstGeom prst="rect">
+            <a:avLst/>
+          </a:prstGeom>
+          <a:solidFill>
+            <a:schemeClr val="accent2">
+              <a:lumMod val="60000"/>
+              <a:lumOff val="40000"/>
+            </a:schemeClr>
+          </a:solidFill>
+          <a:ln>
+            <a:noFill/>
+          </a:ln>
+        </p:spPr>
+        <p:style>
+          <a:lnRef idx="2">
+            <a:schemeClr val="accent1">
+              <a:shade val="50000"/>
+            </a:schemeClr>
+          </a:lnRef>
+          <a:fillRef idx="1">
+            <a:schemeClr val="accent1"/>
+          </a:fillRef>
+          <a:effectRef idx="0">
+            <a:schemeClr val="accent1"/>
+          </a:effectRef>
+          <a:fontRef idx="minor">
+            <a:schemeClr val="lt1"/>
+          </a:fontRef>
+        </p:style>
+        <p:txBody>
+          <a:bodyPr rtlCol="0" anchor="ctr"/>
+          <a:lstStyle/>
+          <a:p>
+            <a:pPr algn="ctr"/>
+            <a:endParaRPr lang="en-US"/>
+          </a:p>
+        </p:txBody>
+      </p:sp>
+      <p:sp>
+        <p:nvSpPr>
+          <p:cNvPr id="3" name="Rectangle 2">
+            <a:extLst>
+              <a:ext uri="{FF2B5EF4-FFF2-40B4-BE49-F238E27FC236}">
+                <a16:creationId xmlns:a16="http://schemas.microsoft.com/office/drawing/2014/main" id="{F25F65F3-4E03-BFC3-B198-028D851A52B0}"/>
+              </a:ext>
+            </a:extLst>
+          </p:cNvPr>
+          <p:cNvSpPr/>
+          <p:nvPr/>
+        </p:nvSpPr>
+        <p:spPr>
+          <a:xfrm>
+            <a:off x="561109" y="3396132"/>
+            <a:ext cx="1225406" cy="152400"/>
+          </a:xfrm>
+          <a:prstGeom prst="rect">
+            <a:avLst/>
+          </a:prstGeom>
+          <a:solidFill>
+            <a:schemeClr val="accent2">
+              <a:lumMod val="60000"/>
+              <a:lumOff val="40000"/>
+            </a:schemeClr>
+          </a:solidFill>
+          <a:ln>
+            <a:noFill/>
+          </a:ln>
+        </p:spPr>
+        <p:style>
+          <a:lnRef idx="2">
+            <a:schemeClr val="accent1">
+              <a:shade val="50000"/>
+            </a:schemeClr>
+          </a:lnRef>
+          <a:fillRef idx="1">
+            <a:schemeClr val="accent1"/>
+          </a:fillRef>
+          <a:effectRef idx="0">
+            <a:schemeClr val="accent1"/>
+          </a:effectRef>
+          <a:fontRef idx="minor">
+            <a:schemeClr val="lt1"/>
+          </a:fontRef>
+        </p:style>
+        <p:txBody>
+          <a:bodyPr rtlCol="0" anchor="ctr"/>
+          <a:lstStyle/>
+          <a:p>
+            <a:pPr algn="ctr"/>
+            <a:endParaRPr lang="en-US" dirty="0"/>
+          </a:p>
+        </p:txBody>
+      </p:sp>
+      <p:sp>
+        <p:nvSpPr>
+          <p:cNvPr id="10" name="Rectangle 9">
+            <a:extLst>
+              <a:ext uri="{FF2B5EF4-FFF2-40B4-BE49-F238E27FC236}">
+                <a16:creationId xmlns:a16="http://schemas.microsoft.com/office/drawing/2014/main" id="{862F8EA7-7E02-B23F-6B59-44423E08552B}"/>
+              </a:ext>
+            </a:extLst>
+          </p:cNvPr>
+          <p:cNvSpPr/>
+          <p:nvPr/>
+        </p:nvSpPr>
+        <p:spPr>
+          <a:xfrm>
+            <a:off x="561109" y="4159827"/>
+            <a:ext cx="1600196" cy="152400"/>
+          </a:xfrm>
+          <a:prstGeom prst="rect">
+            <a:avLst/>
+          </a:prstGeom>
+          <a:solidFill>
+            <a:schemeClr val="accent2">
+              <a:lumMod val="60000"/>
+              <a:lumOff val="40000"/>
+            </a:schemeClr>
+          </a:solidFill>
+          <a:ln>
+            <a:noFill/>
+          </a:ln>
+        </p:spPr>
+        <p:style>
+          <a:lnRef idx="2">
+            <a:schemeClr val="accent1">
+              <a:shade val="50000"/>
+            </a:schemeClr>
+          </a:lnRef>
+          <a:fillRef idx="1">
+            <a:schemeClr val="accent1"/>
+          </a:fillRef>
+          <a:effectRef idx="0">
+            <a:schemeClr val="accent1"/>
+          </a:effectRef>
+          <a:fontRef idx="minor">
+            <a:schemeClr val="lt1"/>
+          </a:fontRef>
+        </p:style>
+        <p:txBody>
+          <a:bodyPr rtlCol="0" anchor="ctr"/>
+          <a:lstStyle/>
+          <a:p>
+            <a:pPr algn="ctr"/>
+            <a:endParaRPr lang="en-US"/>
+          </a:p>
+        </p:txBody>
+      </p:sp>
+      <p:sp>
+        <p:nvSpPr>
+          <p:cNvPr id="11" name="TextBox 10">
+            <a:extLst>
+              <a:ext uri="{FF2B5EF4-FFF2-40B4-BE49-F238E27FC236}">
+                <a16:creationId xmlns:a16="http://schemas.microsoft.com/office/drawing/2014/main" id="{91697255-78B7-2119-1E92-094D192D26B6}"/>
+              </a:ext>
+            </a:extLst>
+          </p:cNvPr>
+          <p:cNvSpPr txBox="1"/>
+          <p:nvPr/>
+        </p:nvSpPr>
+        <p:spPr>
+          <a:xfrm>
+            <a:off x="733285" y="2186602"/>
+            <a:ext cx="1071620" cy="646331"/>
+          </a:xfrm>
+          <a:prstGeom prst="rect">
+            <a:avLst/>
+          </a:prstGeom>
+          <a:noFill/>
+        </p:spPr>
+        <p:txBody>
+          <a:bodyPr wrap="square" rtlCol="0">
+            <a:spAutoFit/>
+          </a:bodyPr>
+          <a:lstStyle/>
+          <a:p>
+            <a:r>
+              <a:rPr lang="en-US" dirty="0" err="1"/>
+              <a:t>Thermo</a:t>
+            </a:r>
+            <a:r>
+              <a:rPr lang="en-US" dirty="0"/>
+              <a:t> box</a:t>
+            </a:r>
+          </a:p>
+        </p:txBody>
+      </p:sp>
+      <p:sp>
+        <p:nvSpPr>
+          <p:cNvPr id="12" name="Rectangle 11">
+            <a:extLst>
+              <a:ext uri="{FF2B5EF4-FFF2-40B4-BE49-F238E27FC236}">
+                <a16:creationId xmlns:a16="http://schemas.microsoft.com/office/drawing/2014/main" id="{EBA54C45-E2FD-5B32-51D1-76C1A26D6899}"/>
+              </a:ext>
+            </a:extLst>
+          </p:cNvPr>
+          <p:cNvSpPr/>
+          <p:nvPr/>
+        </p:nvSpPr>
+        <p:spPr>
+          <a:xfrm>
+            <a:off x="561109" y="3777133"/>
+            <a:ext cx="1225406" cy="152400"/>
+          </a:xfrm>
+          <a:prstGeom prst="rect">
+            <a:avLst/>
+          </a:prstGeom>
+          <a:solidFill>
+            <a:schemeClr val="accent2">
+              <a:lumMod val="60000"/>
+              <a:lumOff val="40000"/>
+            </a:schemeClr>
+          </a:solidFill>
+          <a:ln>
+            <a:noFill/>
+          </a:ln>
+        </p:spPr>
+        <p:style>
+          <a:lnRef idx="2">
+            <a:schemeClr val="accent1">
+              <a:shade val="50000"/>
+            </a:schemeClr>
+          </a:lnRef>
+          <a:fillRef idx="1">
+            <a:schemeClr val="accent1"/>
+          </a:fillRef>
+          <a:effectRef idx="0">
+            <a:schemeClr val="accent1"/>
+          </a:effectRef>
+          <a:fontRef idx="minor">
+            <a:schemeClr val="lt1"/>
+          </a:fontRef>
+        </p:style>
+        <p:txBody>
+          <a:bodyPr rtlCol="0" anchor="ctr"/>
+          <a:lstStyle/>
+          <a:p>
+            <a:pPr algn="ctr"/>
+            <a:endParaRPr lang="en-US" dirty="0"/>
+          </a:p>
+        </p:txBody>
+      </p:sp>
+      <p:sp>
+        <p:nvSpPr>
+          <p:cNvPr id="14" name="TextBox 13">
+            <a:extLst>
+              <a:ext uri="{FF2B5EF4-FFF2-40B4-BE49-F238E27FC236}">
+                <a16:creationId xmlns:a16="http://schemas.microsoft.com/office/drawing/2014/main" id="{EBC82CEF-F99E-4AC9-A1D1-548C298A0258}"/>
+              </a:ext>
+            </a:extLst>
+          </p:cNvPr>
+          <p:cNvSpPr txBox="1"/>
+          <p:nvPr/>
+        </p:nvSpPr>
+        <p:spPr>
+          <a:xfrm>
+            <a:off x="746197" y="4255714"/>
+            <a:ext cx="1071620" cy="646331"/>
+          </a:xfrm>
+          <a:prstGeom prst="rect">
+            <a:avLst/>
+          </a:prstGeom>
+          <a:noFill/>
+        </p:spPr>
+        <p:txBody>
+          <a:bodyPr wrap="square" rtlCol="0">
+            <a:spAutoFit/>
+          </a:bodyPr>
+          <a:lstStyle/>
+          <a:p>
+            <a:r>
+              <a:rPr lang="en-US" dirty="0">
+                <a:solidFill>
+                  <a:schemeClr val="accent2">
+                    <a:lumMod val="50000"/>
+                  </a:schemeClr>
+                </a:solidFill>
+              </a:rPr>
+              <a:t>Copper tubing</a:t>
+            </a:r>
+          </a:p>
+        </p:txBody>
+      </p:sp>
+      <p:grpSp>
+        <p:nvGrpSpPr>
+          <p:cNvPr id="19" name="Group 18">
+            <a:extLst>
+              <a:ext uri="{FF2B5EF4-FFF2-40B4-BE49-F238E27FC236}">
+                <a16:creationId xmlns:a16="http://schemas.microsoft.com/office/drawing/2014/main" id="{F734D3E8-9752-BD8B-9B96-DFE2731E5B5F}"/>
+              </a:ext>
+            </a:extLst>
+          </p:cNvPr>
+          <p:cNvGrpSpPr/>
+          <p:nvPr/>
+        </p:nvGrpSpPr>
+        <p:grpSpPr>
+          <a:xfrm>
+            <a:off x="1422097" y="3396132"/>
+            <a:ext cx="608452" cy="533401"/>
+            <a:chOff x="1422097" y="3365652"/>
+            <a:chExt cx="608452" cy="533401"/>
+          </a:xfrm>
+        </p:grpSpPr>
+        <p:sp>
+          <p:nvSpPr>
+            <p:cNvPr id="16" name="Oval 15">
+              <a:extLst>
+                <a:ext uri="{FF2B5EF4-FFF2-40B4-BE49-F238E27FC236}">
+                  <a16:creationId xmlns:a16="http://schemas.microsoft.com/office/drawing/2014/main" id="{6000516C-7816-9F6A-88AA-5B165D01821C}"/>
+                </a:ext>
+              </a:extLst>
+            </p:cNvPr>
+            <p:cNvSpPr/>
+            <p:nvPr/>
+          </p:nvSpPr>
+          <p:spPr>
+            <a:xfrm>
+              <a:off x="1542478" y="3365652"/>
+              <a:ext cx="488071" cy="533401"/>
+            </a:xfrm>
+            <a:prstGeom prst="ellipse">
+              <a:avLst/>
+            </a:prstGeom>
+            <a:solidFill>
+              <a:schemeClr val="accent2">
+                <a:lumMod val="60000"/>
+                <a:lumOff val="40000"/>
+              </a:schemeClr>
+            </a:solidFill>
+            <a:ln>
+              <a:noFill/>
+            </a:ln>
+          </p:spPr>
+          <p:style>
+            <a:lnRef idx="2">
+              <a:schemeClr val="accent1">
+                <a:shade val="15000"/>
+              </a:schemeClr>
+            </a:lnRef>
+            <a:fillRef idx="1">
+              <a:schemeClr val="accent1"/>
+            </a:fillRef>
+            <a:effectRef idx="0">
+              <a:schemeClr val="accent1"/>
+            </a:effectRef>
+            <a:fontRef idx="minor">
+              <a:schemeClr val="lt1"/>
+            </a:fontRef>
+          </p:style>
+          <p:txBody>
+            <a:bodyPr rtlCol="0" anchor="ctr"/>
+            <a:lstStyle/>
+            <a:p>
+              <a:pPr algn="ctr"/>
+              <a:endParaRPr lang="en-US"/>
+            </a:p>
+          </p:txBody>
+        </p:sp>
+        <p:sp>
+          <p:nvSpPr>
+            <p:cNvPr id="17" name="Oval 16">
+              <a:extLst>
+                <a:ext uri="{FF2B5EF4-FFF2-40B4-BE49-F238E27FC236}">
+                  <a16:creationId xmlns:a16="http://schemas.microsoft.com/office/drawing/2014/main" id="{628219DD-E4F9-1AB1-C65B-7E41A9CD48EA}"/>
+                </a:ext>
+              </a:extLst>
+            </p:cNvPr>
+            <p:cNvSpPr/>
+            <p:nvPr/>
+          </p:nvSpPr>
+          <p:spPr>
+            <a:xfrm>
+              <a:off x="1673922" y="3517707"/>
+              <a:ext cx="221783" cy="227870"/>
+            </a:xfrm>
+            <a:prstGeom prst="ellipse">
+              <a:avLst/>
+            </a:prstGeom>
+            <a:solidFill>
+              <a:schemeClr val="tx1">
+                <a:lumMod val="50000"/>
+                <a:lumOff val="50000"/>
+              </a:schemeClr>
+            </a:solidFill>
+            <a:ln>
+              <a:noFill/>
+            </a:ln>
+          </p:spPr>
+          <p:style>
+            <a:lnRef idx="2">
+              <a:schemeClr val="accent1">
+                <a:shade val="15000"/>
+              </a:schemeClr>
+            </a:lnRef>
+            <a:fillRef idx="1">
+              <a:schemeClr val="accent1"/>
+            </a:fillRef>
+            <a:effectRef idx="0">
+              <a:schemeClr val="accent1"/>
+            </a:effectRef>
+            <a:fontRef idx="minor">
+              <a:schemeClr val="lt1"/>
+            </a:fontRef>
+          </p:style>
+          <p:txBody>
+            <a:bodyPr rtlCol="0" anchor="ctr"/>
+            <a:lstStyle/>
+            <a:p>
+              <a:pPr algn="ctr"/>
+              <a:endParaRPr lang="en-US"/>
+            </a:p>
+          </p:txBody>
+        </p:sp>
+        <p:sp>
+          <p:nvSpPr>
+            <p:cNvPr id="18" name="Rectangle 17">
+              <a:extLst>
+                <a:ext uri="{FF2B5EF4-FFF2-40B4-BE49-F238E27FC236}">
+                  <a16:creationId xmlns:a16="http://schemas.microsoft.com/office/drawing/2014/main" id="{C29668F5-8A5C-ABF1-72DD-2E33029388B1}"/>
+                </a:ext>
+              </a:extLst>
+            </p:cNvPr>
+            <p:cNvSpPr/>
+            <p:nvPr/>
+          </p:nvSpPr>
+          <p:spPr>
+            <a:xfrm>
+              <a:off x="1422097" y="3518052"/>
+              <a:ext cx="378267" cy="227870"/>
+            </a:xfrm>
+            <a:prstGeom prst="rect">
+              <a:avLst/>
+            </a:prstGeom>
+            <a:solidFill>
+              <a:schemeClr val="tx1">
+                <a:lumMod val="50000"/>
+                <a:lumOff val="50000"/>
+              </a:schemeClr>
+            </a:solidFill>
+            <a:ln>
+              <a:noFill/>
+            </a:ln>
+          </p:spPr>
+          <p:style>
+            <a:lnRef idx="2">
+              <a:schemeClr val="accent1">
+                <a:shade val="15000"/>
+              </a:schemeClr>
+            </a:lnRef>
+            <a:fillRef idx="1">
+              <a:schemeClr val="accent1"/>
+            </a:fillRef>
+            <a:effectRef idx="0">
+              <a:schemeClr val="accent1"/>
+            </a:effectRef>
+            <a:fontRef idx="minor">
+              <a:schemeClr val="lt1"/>
+            </a:fontRef>
+          </p:style>
+          <p:txBody>
+            <a:bodyPr rtlCol="0" anchor="ctr"/>
+            <a:lstStyle/>
+            <a:p>
+              <a:pPr algn="ctr"/>
+              <a:endParaRPr lang="en-US"/>
+            </a:p>
+          </p:txBody>
+        </p:sp>
+      </p:grpSp>
+      <p:grpSp>
+        <p:nvGrpSpPr>
+          <p:cNvPr id="20" name="Group 19">
+            <a:extLst>
+              <a:ext uri="{FF2B5EF4-FFF2-40B4-BE49-F238E27FC236}">
+                <a16:creationId xmlns:a16="http://schemas.microsoft.com/office/drawing/2014/main" id="{FED4B5C9-C3B8-5D4D-C5FA-6B595667A3EE}"/>
+              </a:ext>
+            </a:extLst>
+          </p:cNvPr>
+          <p:cNvGrpSpPr/>
+          <p:nvPr/>
+        </p:nvGrpSpPr>
+        <p:grpSpPr>
+          <a:xfrm rot="10800000">
+            <a:off x="317996" y="3779663"/>
+            <a:ext cx="608452" cy="533401"/>
+            <a:chOff x="1422097" y="3365652"/>
+            <a:chExt cx="608452" cy="533401"/>
+          </a:xfrm>
+        </p:grpSpPr>
+        <p:sp>
+          <p:nvSpPr>
+            <p:cNvPr id="21" name="Oval 20">
+              <a:extLst>
+                <a:ext uri="{FF2B5EF4-FFF2-40B4-BE49-F238E27FC236}">
+                  <a16:creationId xmlns:a16="http://schemas.microsoft.com/office/drawing/2014/main" id="{AEB4507F-B0D0-BD49-2CAF-3A89EF323C93}"/>
+                </a:ext>
+              </a:extLst>
+            </p:cNvPr>
+            <p:cNvSpPr/>
+            <p:nvPr/>
+          </p:nvSpPr>
+          <p:spPr>
+            <a:xfrm>
+              <a:off x="1542478" y="3365652"/>
+              <a:ext cx="488071" cy="533401"/>
+            </a:xfrm>
+            <a:prstGeom prst="ellipse">
+              <a:avLst/>
+            </a:prstGeom>
+            <a:solidFill>
+              <a:schemeClr val="accent2">
+                <a:lumMod val="60000"/>
+                <a:lumOff val="40000"/>
+              </a:schemeClr>
+            </a:solidFill>
+            <a:ln>
+              <a:noFill/>
+            </a:ln>
+          </p:spPr>
+          <p:style>
+            <a:lnRef idx="2">
+              <a:schemeClr val="accent1">
+                <a:shade val="15000"/>
+              </a:schemeClr>
+            </a:lnRef>
+            <a:fillRef idx="1">
+              <a:schemeClr val="accent1"/>
+            </a:fillRef>
+            <a:effectRef idx="0">
+              <a:schemeClr val="accent1"/>
+            </a:effectRef>
+            <a:fontRef idx="minor">
+              <a:schemeClr val="lt1"/>
+            </a:fontRef>
+          </p:style>
+          <p:txBody>
+            <a:bodyPr rtlCol="0" anchor="ctr"/>
+            <a:lstStyle/>
+            <a:p>
+              <a:pPr algn="ctr"/>
+              <a:endParaRPr lang="en-US"/>
+            </a:p>
+          </p:txBody>
+        </p:sp>
+        <p:sp>
+          <p:nvSpPr>
+            <p:cNvPr id="22" name="Oval 21">
+              <a:extLst>
+                <a:ext uri="{FF2B5EF4-FFF2-40B4-BE49-F238E27FC236}">
+                  <a16:creationId xmlns:a16="http://schemas.microsoft.com/office/drawing/2014/main" id="{2F9038B8-E8A9-9DBA-6CC8-F25647946AF1}"/>
+                </a:ext>
+              </a:extLst>
+            </p:cNvPr>
+            <p:cNvSpPr/>
+            <p:nvPr/>
+          </p:nvSpPr>
+          <p:spPr>
+            <a:xfrm>
+              <a:off x="1673922" y="3517707"/>
+              <a:ext cx="221783" cy="227870"/>
+            </a:xfrm>
+            <a:prstGeom prst="ellipse">
+              <a:avLst/>
+            </a:prstGeom>
+            <a:solidFill>
+              <a:schemeClr val="tx1">
+                <a:lumMod val="50000"/>
+                <a:lumOff val="50000"/>
+              </a:schemeClr>
+            </a:solidFill>
+            <a:ln>
+              <a:noFill/>
+            </a:ln>
+          </p:spPr>
+          <p:style>
+            <a:lnRef idx="2">
+              <a:schemeClr val="accent1">
+                <a:shade val="15000"/>
+              </a:schemeClr>
+            </a:lnRef>
+            <a:fillRef idx="1">
+              <a:schemeClr val="accent1"/>
+            </a:fillRef>
+            <a:effectRef idx="0">
+              <a:schemeClr val="accent1"/>
+            </a:effectRef>
+            <a:fontRef idx="minor">
+              <a:schemeClr val="lt1"/>
+            </a:fontRef>
+          </p:style>
+          <p:txBody>
+            <a:bodyPr rtlCol="0" anchor="ctr"/>
+            <a:lstStyle/>
+            <a:p>
+              <a:pPr algn="ctr"/>
+              <a:endParaRPr lang="en-US"/>
+            </a:p>
+          </p:txBody>
+        </p:sp>
+        <p:sp>
+          <p:nvSpPr>
+            <p:cNvPr id="23" name="Rectangle 22">
+              <a:extLst>
+                <a:ext uri="{FF2B5EF4-FFF2-40B4-BE49-F238E27FC236}">
+                  <a16:creationId xmlns:a16="http://schemas.microsoft.com/office/drawing/2014/main" id="{CE0020DD-8635-EC85-D8B3-AB53E0A93AA2}"/>
+                </a:ext>
+              </a:extLst>
+            </p:cNvPr>
+            <p:cNvSpPr/>
+            <p:nvPr/>
+          </p:nvSpPr>
+          <p:spPr>
+            <a:xfrm>
+              <a:off x="1422097" y="3518052"/>
+              <a:ext cx="378267" cy="227870"/>
+            </a:xfrm>
+            <a:prstGeom prst="rect">
+              <a:avLst/>
+            </a:prstGeom>
+            <a:solidFill>
+              <a:schemeClr val="tx1">
+                <a:lumMod val="50000"/>
+                <a:lumOff val="50000"/>
+              </a:schemeClr>
+            </a:solidFill>
+            <a:ln>
+              <a:noFill/>
+            </a:ln>
+          </p:spPr>
+          <p:style>
+            <a:lnRef idx="2">
+              <a:schemeClr val="accent1">
+                <a:shade val="15000"/>
+              </a:schemeClr>
+            </a:lnRef>
+            <a:fillRef idx="1">
+              <a:schemeClr val="accent1"/>
+            </a:fillRef>
+            <a:effectRef idx="0">
+              <a:schemeClr val="accent1"/>
+            </a:effectRef>
+            <a:fontRef idx="minor">
+              <a:schemeClr val="lt1"/>
+            </a:fontRef>
+          </p:style>
+          <p:txBody>
+            <a:bodyPr rtlCol="0" anchor="ctr"/>
+            <a:lstStyle/>
+            <a:p>
+              <a:pPr algn="ctr"/>
+              <a:endParaRPr lang="en-US"/>
+            </a:p>
+          </p:txBody>
+        </p:sp>
+      </p:grpSp>
+      <p:grpSp>
+        <p:nvGrpSpPr>
+          <p:cNvPr id="24" name="Group 23">
+            <a:extLst>
+              <a:ext uri="{FF2B5EF4-FFF2-40B4-BE49-F238E27FC236}">
+                <a16:creationId xmlns:a16="http://schemas.microsoft.com/office/drawing/2014/main" id="{8A8CFCE0-BF96-9486-6366-B789AF58A64A}"/>
+              </a:ext>
+            </a:extLst>
+          </p:cNvPr>
+          <p:cNvGrpSpPr/>
+          <p:nvPr/>
+        </p:nvGrpSpPr>
+        <p:grpSpPr>
+          <a:xfrm rot="10800000">
+            <a:off x="306185" y="3015303"/>
+            <a:ext cx="608452" cy="533401"/>
+            <a:chOff x="1422097" y="3365652"/>
+            <a:chExt cx="608452" cy="533401"/>
+          </a:xfrm>
+        </p:grpSpPr>
+        <p:sp>
+          <p:nvSpPr>
+            <p:cNvPr id="25" name="Oval 24">
+              <a:extLst>
+                <a:ext uri="{FF2B5EF4-FFF2-40B4-BE49-F238E27FC236}">
+                  <a16:creationId xmlns:a16="http://schemas.microsoft.com/office/drawing/2014/main" id="{231ECFE9-3A15-8935-4CAF-0CB935EB1056}"/>
+                </a:ext>
+              </a:extLst>
+            </p:cNvPr>
+            <p:cNvSpPr/>
+            <p:nvPr/>
+          </p:nvSpPr>
+          <p:spPr>
+            <a:xfrm>
+              <a:off x="1542478" y="3365652"/>
+              <a:ext cx="488071" cy="533401"/>
+            </a:xfrm>
+            <a:prstGeom prst="ellipse">
+              <a:avLst/>
+            </a:prstGeom>
+            <a:solidFill>
+              <a:schemeClr val="accent2">
+                <a:lumMod val="60000"/>
+                <a:lumOff val="40000"/>
+              </a:schemeClr>
+            </a:solidFill>
+            <a:ln>
+              <a:noFill/>
+            </a:ln>
+          </p:spPr>
+          <p:style>
+            <a:lnRef idx="2">
+              <a:schemeClr val="accent1">
+                <a:shade val="15000"/>
+              </a:schemeClr>
+            </a:lnRef>
+            <a:fillRef idx="1">
+              <a:schemeClr val="accent1"/>
+            </a:fillRef>
+            <a:effectRef idx="0">
+              <a:schemeClr val="accent1"/>
+            </a:effectRef>
+            <a:fontRef idx="minor">
+              <a:schemeClr val="lt1"/>
+            </a:fontRef>
+          </p:style>
+          <p:txBody>
+            <a:bodyPr rtlCol="0" anchor="ctr"/>
+            <a:lstStyle/>
+            <a:p>
+              <a:pPr algn="ctr"/>
+              <a:endParaRPr lang="en-US"/>
+            </a:p>
+          </p:txBody>
+        </p:sp>
+        <p:sp>
+          <p:nvSpPr>
+            <p:cNvPr id="34" name="Oval 33">
+              <a:extLst>
+                <a:ext uri="{FF2B5EF4-FFF2-40B4-BE49-F238E27FC236}">
+                  <a16:creationId xmlns:a16="http://schemas.microsoft.com/office/drawing/2014/main" id="{18C50D56-EB99-E834-AABD-6D9284C3E7C3}"/>
+                </a:ext>
+              </a:extLst>
+            </p:cNvPr>
+            <p:cNvSpPr/>
+            <p:nvPr/>
+          </p:nvSpPr>
+          <p:spPr>
+            <a:xfrm>
+              <a:off x="1673922" y="3517707"/>
+              <a:ext cx="221783" cy="227870"/>
+            </a:xfrm>
+            <a:prstGeom prst="ellipse">
+              <a:avLst/>
+            </a:prstGeom>
+            <a:solidFill>
+              <a:schemeClr val="tx1">
+                <a:lumMod val="50000"/>
+                <a:lumOff val="50000"/>
+              </a:schemeClr>
+            </a:solidFill>
+            <a:ln>
+              <a:noFill/>
+            </a:ln>
+          </p:spPr>
+          <p:style>
+            <a:lnRef idx="2">
+              <a:schemeClr val="accent1">
+                <a:shade val="15000"/>
+              </a:schemeClr>
+            </a:lnRef>
+            <a:fillRef idx="1">
+              <a:schemeClr val="accent1"/>
+            </a:fillRef>
+            <a:effectRef idx="0">
+              <a:schemeClr val="accent1"/>
+            </a:effectRef>
+            <a:fontRef idx="minor">
+              <a:schemeClr val="lt1"/>
+            </a:fontRef>
+          </p:style>
+          <p:txBody>
+            <a:bodyPr rtlCol="0" anchor="ctr"/>
+            <a:lstStyle/>
+            <a:p>
+              <a:pPr algn="ctr"/>
+              <a:endParaRPr lang="en-US"/>
+            </a:p>
+          </p:txBody>
+        </p:sp>
+        <p:sp>
+          <p:nvSpPr>
+            <p:cNvPr id="35" name="Rectangle 34">
+              <a:extLst>
+                <a:ext uri="{FF2B5EF4-FFF2-40B4-BE49-F238E27FC236}">
+                  <a16:creationId xmlns:a16="http://schemas.microsoft.com/office/drawing/2014/main" id="{3EB3EB53-E4F1-1C48-9A3E-FB33FAA97CD6}"/>
+                </a:ext>
+              </a:extLst>
+            </p:cNvPr>
+            <p:cNvSpPr/>
+            <p:nvPr/>
+          </p:nvSpPr>
+          <p:spPr>
+            <a:xfrm>
+              <a:off x="1422097" y="3518052"/>
+              <a:ext cx="378267" cy="227870"/>
+            </a:xfrm>
+            <a:prstGeom prst="rect">
+              <a:avLst/>
+            </a:prstGeom>
+            <a:solidFill>
+              <a:schemeClr val="tx1">
+                <a:lumMod val="50000"/>
+                <a:lumOff val="50000"/>
+              </a:schemeClr>
+            </a:solidFill>
+            <a:ln>
+              <a:noFill/>
+            </a:ln>
+          </p:spPr>
+          <p:style>
+            <a:lnRef idx="2">
+              <a:schemeClr val="accent1">
+                <a:shade val="15000"/>
+              </a:schemeClr>
+            </a:lnRef>
+            <a:fillRef idx="1">
+              <a:schemeClr val="accent1"/>
+            </a:fillRef>
+            <a:effectRef idx="0">
+              <a:schemeClr val="accent1"/>
+            </a:effectRef>
+            <a:fontRef idx="minor">
+              <a:schemeClr val="lt1"/>
+            </a:fontRef>
+          </p:style>
+          <p:txBody>
+            <a:bodyPr rtlCol="0" anchor="ctr"/>
+            <a:lstStyle/>
+            <a:p>
+              <a:pPr algn="ctr"/>
+              <a:endParaRPr lang="en-US"/>
+            </a:p>
+          </p:txBody>
+        </p:sp>
+      </p:grpSp>
     </p:spTree>
     <p:extLst>
       <p:ext uri="{BB962C8B-B14F-4D97-AF65-F5344CB8AC3E}">

</xml_diff>

<commit_message>
Added relay details in valve wiring diagram
</commit_message>
<xml_diff>
--- a/docs/Thermo Assay V2 Diagrams.pptx
+++ b/docs/Thermo Assay V2 Diagrams.pptx
@@ -260,7 +260,7 @@
           <a:p>
             <a:fld id="{204E7148-8D04-458F-B52F-6ED835371B9A}" type="datetimeFigureOut">
               <a:rPr lang="en-US" smtClean="0"/>
-              <a:t>10/12/2024</a:t>
+              <a:t>11/13/2024</a:t>
             </a:fld>
             <a:endParaRPr lang="en-US"/>
           </a:p>
@@ -458,7 +458,7 @@
           <a:p>
             <a:fld id="{204E7148-8D04-458F-B52F-6ED835371B9A}" type="datetimeFigureOut">
               <a:rPr lang="en-US" smtClean="0"/>
-              <a:t>10/12/2024</a:t>
+              <a:t>11/13/2024</a:t>
             </a:fld>
             <a:endParaRPr lang="en-US"/>
           </a:p>
@@ -666,7 +666,7 @@
           <a:p>
             <a:fld id="{204E7148-8D04-458F-B52F-6ED835371B9A}" type="datetimeFigureOut">
               <a:rPr lang="en-US" smtClean="0"/>
-              <a:t>10/12/2024</a:t>
+              <a:t>11/13/2024</a:t>
             </a:fld>
             <a:endParaRPr lang="en-US"/>
           </a:p>
@@ -864,7 +864,7 @@
           <a:p>
             <a:fld id="{204E7148-8D04-458F-B52F-6ED835371B9A}" type="datetimeFigureOut">
               <a:rPr lang="en-US" smtClean="0"/>
-              <a:t>10/12/2024</a:t>
+              <a:t>11/13/2024</a:t>
             </a:fld>
             <a:endParaRPr lang="en-US"/>
           </a:p>
@@ -1139,7 +1139,7 @@
           <a:p>
             <a:fld id="{204E7148-8D04-458F-B52F-6ED835371B9A}" type="datetimeFigureOut">
               <a:rPr lang="en-US" smtClean="0"/>
-              <a:t>10/12/2024</a:t>
+              <a:t>11/13/2024</a:t>
             </a:fld>
             <a:endParaRPr lang="en-US"/>
           </a:p>
@@ -1404,7 +1404,7 @@
           <a:p>
             <a:fld id="{204E7148-8D04-458F-B52F-6ED835371B9A}" type="datetimeFigureOut">
               <a:rPr lang="en-US" smtClean="0"/>
-              <a:t>10/12/2024</a:t>
+              <a:t>11/13/2024</a:t>
             </a:fld>
             <a:endParaRPr lang="en-US"/>
           </a:p>
@@ -1816,7 +1816,7 @@
           <a:p>
             <a:fld id="{204E7148-8D04-458F-B52F-6ED835371B9A}" type="datetimeFigureOut">
               <a:rPr lang="en-US" smtClean="0"/>
-              <a:t>10/12/2024</a:t>
+              <a:t>11/13/2024</a:t>
             </a:fld>
             <a:endParaRPr lang="en-US"/>
           </a:p>
@@ -1957,7 +1957,7 @@
           <a:p>
             <a:fld id="{204E7148-8D04-458F-B52F-6ED835371B9A}" type="datetimeFigureOut">
               <a:rPr lang="en-US" smtClean="0"/>
-              <a:t>10/12/2024</a:t>
+              <a:t>11/13/2024</a:t>
             </a:fld>
             <a:endParaRPr lang="en-US"/>
           </a:p>
@@ -2070,7 +2070,7 @@
           <a:p>
             <a:fld id="{204E7148-8D04-458F-B52F-6ED835371B9A}" type="datetimeFigureOut">
               <a:rPr lang="en-US" smtClean="0"/>
-              <a:t>10/12/2024</a:t>
+              <a:t>11/13/2024</a:t>
             </a:fld>
             <a:endParaRPr lang="en-US"/>
           </a:p>
@@ -2381,7 +2381,7 @@
           <a:p>
             <a:fld id="{204E7148-8D04-458F-B52F-6ED835371B9A}" type="datetimeFigureOut">
               <a:rPr lang="en-US" smtClean="0"/>
-              <a:t>10/12/2024</a:t>
+              <a:t>11/13/2024</a:t>
             </a:fld>
             <a:endParaRPr lang="en-US"/>
           </a:p>
@@ -2669,7 +2669,7 @@
           <a:p>
             <a:fld id="{204E7148-8D04-458F-B52F-6ED835371B9A}" type="datetimeFigureOut">
               <a:rPr lang="en-US" smtClean="0"/>
-              <a:t>10/12/2024</a:t>
+              <a:t>11/13/2024</a:t>
             </a:fld>
             <a:endParaRPr lang="en-US"/>
           </a:p>
@@ -2910,7 +2910,7 @@
           <a:p>
             <a:fld id="{204E7148-8D04-458F-B52F-6ED835371B9A}" type="datetimeFigureOut">
               <a:rPr lang="en-US" smtClean="0"/>
-              <a:t>10/12/2024</a:t>
+              <a:t>11/13/2024</a:t>
             </a:fld>
             <a:endParaRPr lang="en-US"/>
           </a:p>
@@ -6771,8 +6771,8 @@
         </p:nvCxnSpPr>
         <p:spPr>
           <a:xfrm>
-            <a:off x="5576454" y="3122756"/>
-            <a:ext cx="632890" cy="0"/>
+            <a:off x="4155440" y="3194003"/>
+            <a:ext cx="1471119" cy="1883"/>
           </a:xfrm>
           <a:prstGeom prst="line">
             <a:avLst/>
@@ -6814,7 +6814,7 @@
         </p:nvCxnSpPr>
         <p:spPr>
           <a:xfrm>
-            <a:off x="6525490" y="3122756"/>
+            <a:off x="6090025" y="3195886"/>
             <a:ext cx="773946" cy="0"/>
           </a:xfrm>
           <a:prstGeom prst="line">
@@ -7018,12 +7018,55 @@
           </a:fontRef>
         </p:style>
       </p:cxnSp>
-      <p:sp>
-        <p:nvSpPr>
-          <p:cNvPr id="10" name="Rectangle 9">
-            <a:extLst>
-              <a:ext uri="{FF2B5EF4-FFF2-40B4-BE49-F238E27FC236}">
-                <a16:creationId xmlns:a16="http://schemas.microsoft.com/office/drawing/2014/main" id="{D3B2F1F4-AEF8-46DB-A492-72C614F04707}"/>
+      <p:cxnSp>
+        <p:nvCxnSpPr>
+          <p:cNvPr id="11" name="Straight Connector 10">
+            <a:extLst>
+              <a:ext uri="{FF2B5EF4-FFF2-40B4-BE49-F238E27FC236}">
+                <a16:creationId xmlns:a16="http://schemas.microsoft.com/office/drawing/2014/main" id="{D16ECBD1-E220-4C07-B640-798CB4B9AE61}"/>
+              </a:ext>
+            </a:extLst>
+          </p:cNvPr>
+          <p:cNvCxnSpPr>
+            <a:cxnSpLocks/>
+          </p:cNvCxnSpPr>
+          <p:nvPr/>
+        </p:nvCxnSpPr>
+        <p:spPr>
+          <a:xfrm flipV="1">
+            <a:off x="4024744" y="3176155"/>
+            <a:ext cx="0" cy="252846"/>
+          </a:xfrm>
+          <a:prstGeom prst="line">
+            <a:avLst/>
+          </a:prstGeom>
+          <a:ln w="76200">
+            <a:solidFill>
+              <a:srgbClr val="FF0000"/>
+            </a:solidFill>
+          </a:ln>
+        </p:spPr>
+        <p:style>
+          <a:lnRef idx="1">
+            <a:schemeClr val="accent1"/>
+          </a:lnRef>
+          <a:fillRef idx="0">
+            <a:schemeClr val="accent1"/>
+          </a:fillRef>
+          <a:effectRef idx="0">
+            <a:schemeClr val="accent1"/>
+          </a:effectRef>
+          <a:fontRef idx="minor">
+            <a:schemeClr val="tx1"/>
+          </a:fontRef>
+        </p:style>
+      </p:cxnSp>
+      <p:sp>
+        <p:nvSpPr>
+          <p:cNvPr id="14" name="Oval 13">
+            <a:extLst>
+              <a:ext uri="{FF2B5EF4-FFF2-40B4-BE49-F238E27FC236}">
+                <a16:creationId xmlns:a16="http://schemas.microsoft.com/office/drawing/2014/main" id="{7E85B057-04DB-4E72-9457-FD9F2B2A7427}"/>
               </a:ext>
             </a:extLst>
           </p:cNvPr>
@@ -7032,16 +7075,14 @@
         </p:nvSpPr>
         <p:spPr>
           <a:xfrm>
-            <a:off x="3913908" y="3022312"/>
-            <a:ext cx="1787236" cy="228600"/>
-          </a:xfrm>
-          <a:prstGeom prst="rect">
+            <a:off x="5590784" y="2922260"/>
+            <a:ext cx="630382" cy="574963"/>
+          </a:xfrm>
+          <a:prstGeom prst="ellipse">
             <a:avLst/>
           </a:prstGeom>
           <a:solidFill>
-            <a:schemeClr val="accent6">
-              <a:lumMod val="75000"/>
-            </a:schemeClr>
+            <a:schemeClr val="tx1"/>
           </a:solidFill>
         </p:spPr>
         <p:style>
@@ -7066,18 +7107,18 @@
           <a:p>
             <a:pPr algn="ctr"/>
             <a:r>
-              <a:rPr lang="en-US" sz="1200" dirty="0"/>
-              <a:t>Screw terminal</a:t>
+              <a:rPr lang="en-US" sz="1200" b="1" dirty="0"/>
+              <a:t>12 v DC</a:t>
             </a:r>
           </a:p>
         </p:txBody>
       </p:sp>
       <p:cxnSp>
         <p:nvCxnSpPr>
-          <p:cNvPr id="11" name="Straight Connector 10">
-            <a:extLst>
-              <a:ext uri="{FF2B5EF4-FFF2-40B4-BE49-F238E27FC236}">
-                <a16:creationId xmlns:a16="http://schemas.microsoft.com/office/drawing/2014/main" id="{D16ECBD1-E220-4C07-B640-798CB4B9AE61}"/>
+          <p:cNvPr id="36" name="Straight Connector 35">
+            <a:extLst>
+              <a:ext uri="{FF2B5EF4-FFF2-40B4-BE49-F238E27FC236}">
+                <a16:creationId xmlns:a16="http://schemas.microsoft.com/office/drawing/2014/main" id="{5F41028B-49D7-4024-B912-C412564C4E5E}"/>
               </a:ext>
             </a:extLst>
           </p:cNvPr>
@@ -7088,15 +7129,15 @@
         </p:nvCxnSpPr>
         <p:spPr>
           <a:xfrm flipV="1">
-            <a:off x="4024744" y="3176155"/>
-            <a:ext cx="0" cy="252846"/>
+            <a:off x="4066309" y="3176155"/>
+            <a:ext cx="0" cy="1259039"/>
           </a:xfrm>
           <a:prstGeom prst="line">
             <a:avLst/>
           </a:prstGeom>
           <a:ln w="76200">
             <a:solidFill>
-              <a:srgbClr val="FF0000"/>
+              <a:schemeClr val="tx1"/>
             </a:solidFill>
           </a:ln>
         </p:spPr>
@@ -7117,209 +7158,6 @@
       </p:cxnSp>
       <p:sp>
         <p:nvSpPr>
-          <p:cNvPr id="32" name="Rectangle 31">
-            <a:extLst>
-              <a:ext uri="{FF2B5EF4-FFF2-40B4-BE49-F238E27FC236}">
-                <a16:creationId xmlns:a16="http://schemas.microsoft.com/office/drawing/2014/main" id="{15FA9A8D-EA29-44EC-8312-F85FB22D0520}"/>
-              </a:ext>
-            </a:extLst>
-          </p:cNvPr>
-          <p:cNvSpPr/>
-          <p:nvPr/>
-        </p:nvSpPr>
-        <p:spPr>
-          <a:xfrm>
-            <a:off x="3934689" y="4339940"/>
-            <a:ext cx="1787236" cy="228600"/>
-          </a:xfrm>
-          <a:prstGeom prst="rect">
-            <a:avLst/>
-          </a:prstGeom>
-          <a:solidFill>
-            <a:schemeClr val="accent6">
-              <a:lumMod val="75000"/>
-            </a:schemeClr>
-          </a:solidFill>
-        </p:spPr>
-        <p:style>
-          <a:lnRef idx="2">
-            <a:schemeClr val="accent1">
-              <a:shade val="50000"/>
-            </a:schemeClr>
-          </a:lnRef>
-          <a:fillRef idx="1">
-            <a:schemeClr val="accent1"/>
-          </a:fillRef>
-          <a:effectRef idx="0">
-            <a:schemeClr val="accent1"/>
-          </a:effectRef>
-          <a:fontRef idx="minor">
-            <a:schemeClr val="lt1"/>
-          </a:fontRef>
-        </p:style>
-        <p:txBody>
-          <a:bodyPr rtlCol="0" anchor="ctr"/>
-          <a:lstStyle/>
-          <a:p>
-            <a:pPr algn="ctr"/>
-            <a:r>
-              <a:rPr lang="en-US" sz="1200" dirty="0"/>
-              <a:t>Screw terminal</a:t>
-            </a:r>
-          </a:p>
-        </p:txBody>
-      </p:sp>
-      <p:sp>
-        <p:nvSpPr>
-          <p:cNvPr id="13" name="Rectangle 12">
-            <a:extLst>
-              <a:ext uri="{FF2B5EF4-FFF2-40B4-BE49-F238E27FC236}">
-                <a16:creationId xmlns:a16="http://schemas.microsoft.com/office/drawing/2014/main" id="{8C6610C8-48E5-4570-B99D-7183E95095EB}"/>
-              </a:ext>
-            </a:extLst>
-          </p:cNvPr>
-          <p:cNvSpPr/>
-          <p:nvPr/>
-        </p:nvSpPr>
-        <p:spPr>
-          <a:xfrm>
-            <a:off x="6957492" y="3022312"/>
-            <a:ext cx="1787236" cy="228600"/>
-          </a:xfrm>
-          <a:prstGeom prst="rect">
-            <a:avLst/>
-          </a:prstGeom>
-          <a:solidFill>
-            <a:schemeClr val="accent6">
-              <a:lumMod val="75000"/>
-            </a:schemeClr>
-          </a:solidFill>
-        </p:spPr>
-        <p:style>
-          <a:lnRef idx="2">
-            <a:schemeClr val="accent1">
-              <a:shade val="50000"/>
-            </a:schemeClr>
-          </a:lnRef>
-          <a:fillRef idx="1">
-            <a:schemeClr val="accent1"/>
-          </a:fillRef>
-          <a:effectRef idx="0">
-            <a:schemeClr val="accent1"/>
-          </a:effectRef>
-          <a:fontRef idx="minor">
-            <a:schemeClr val="lt1"/>
-          </a:fontRef>
-        </p:style>
-        <p:txBody>
-          <a:bodyPr rtlCol="0" anchor="ctr"/>
-          <a:lstStyle/>
-          <a:p>
-            <a:pPr algn="ctr"/>
-            <a:r>
-              <a:rPr lang="en-US" sz="1200" dirty="0"/>
-              <a:t>Screw terminal</a:t>
-            </a:r>
-          </a:p>
-        </p:txBody>
-      </p:sp>
-      <p:sp>
-        <p:nvSpPr>
-          <p:cNvPr id="14" name="Oval 13">
-            <a:extLst>
-              <a:ext uri="{FF2B5EF4-FFF2-40B4-BE49-F238E27FC236}">
-                <a16:creationId xmlns:a16="http://schemas.microsoft.com/office/drawing/2014/main" id="{7E85B057-04DB-4E72-9457-FD9F2B2A7427}"/>
-              </a:ext>
-            </a:extLst>
-          </p:cNvPr>
-          <p:cNvSpPr/>
-          <p:nvPr/>
-        </p:nvSpPr>
-        <p:spPr>
-          <a:xfrm>
-            <a:off x="6026249" y="2849130"/>
-            <a:ext cx="630382" cy="574963"/>
-          </a:xfrm>
-          <a:prstGeom prst="ellipse">
-            <a:avLst/>
-          </a:prstGeom>
-          <a:solidFill>
-            <a:schemeClr val="tx1"/>
-          </a:solidFill>
-        </p:spPr>
-        <p:style>
-          <a:lnRef idx="2">
-            <a:schemeClr val="accent1">
-              <a:shade val="50000"/>
-            </a:schemeClr>
-          </a:lnRef>
-          <a:fillRef idx="1">
-            <a:schemeClr val="accent1"/>
-          </a:fillRef>
-          <a:effectRef idx="0">
-            <a:schemeClr val="accent1"/>
-          </a:effectRef>
-          <a:fontRef idx="minor">
-            <a:schemeClr val="lt1"/>
-          </a:fontRef>
-        </p:style>
-        <p:txBody>
-          <a:bodyPr rtlCol="0" anchor="ctr"/>
-          <a:lstStyle/>
-          <a:p>
-            <a:pPr algn="ctr"/>
-            <a:r>
-              <a:rPr lang="en-US" sz="1200" b="1" dirty="0"/>
-              <a:t>12 v DC</a:t>
-            </a:r>
-          </a:p>
-        </p:txBody>
-      </p:sp>
-      <p:cxnSp>
-        <p:nvCxnSpPr>
-          <p:cNvPr id="36" name="Straight Connector 35">
-            <a:extLst>
-              <a:ext uri="{FF2B5EF4-FFF2-40B4-BE49-F238E27FC236}">
-                <a16:creationId xmlns:a16="http://schemas.microsoft.com/office/drawing/2014/main" id="{5F41028B-49D7-4024-B912-C412564C4E5E}"/>
-              </a:ext>
-            </a:extLst>
-          </p:cNvPr>
-          <p:cNvCxnSpPr>
-            <a:cxnSpLocks/>
-          </p:cNvCxnSpPr>
-          <p:nvPr/>
-        </p:nvCxnSpPr>
-        <p:spPr>
-          <a:xfrm flipV="1">
-            <a:off x="4066309" y="3176155"/>
-            <a:ext cx="0" cy="1259039"/>
-          </a:xfrm>
-          <a:prstGeom prst="line">
-            <a:avLst/>
-          </a:prstGeom>
-          <a:ln w="76200">
-            <a:solidFill>
-              <a:schemeClr val="tx1"/>
-            </a:solidFill>
-          </a:ln>
-        </p:spPr>
-        <p:style>
-          <a:lnRef idx="1">
-            <a:schemeClr val="accent1"/>
-          </a:lnRef>
-          <a:fillRef idx="0">
-            <a:schemeClr val="accent1"/>
-          </a:fillRef>
-          <a:effectRef idx="0">
-            <a:schemeClr val="accent1"/>
-          </a:effectRef>
-          <a:fontRef idx="minor">
-            <a:schemeClr val="tx1"/>
-          </a:fontRef>
-        </p:style>
-      </p:cxnSp>
-      <p:sp>
-        <p:nvSpPr>
           <p:cNvPr id="30" name="TextBox 29">
             <a:extLst>
               <a:ext uri="{FF2B5EF4-FFF2-40B4-BE49-F238E27FC236}">
@@ -7332,7 +7170,7 @@
         </p:nvSpPr>
         <p:spPr>
           <a:xfrm>
-            <a:off x="5721925" y="2679351"/>
+            <a:off x="5286460" y="2752481"/>
             <a:ext cx="329045" cy="400110"/>
           </a:xfrm>
           <a:prstGeom prst="rect">
@@ -7367,7 +7205,7 @@
         </p:nvSpPr>
         <p:spPr>
           <a:xfrm>
-            <a:off x="6631909" y="2590590"/>
+            <a:off x="6196445" y="2670783"/>
             <a:ext cx="329045" cy="523220"/>
           </a:xfrm>
           <a:prstGeom prst="rect">
@@ -7594,7 +7432,7 @@
         <p:spPr>
           <a:xfrm>
             <a:off x="4073231" y="4814455"/>
-            <a:ext cx="2452259" cy="0"/>
+            <a:ext cx="2485684" cy="0"/>
           </a:xfrm>
           <a:prstGeom prst="line">
             <a:avLst/>
@@ -7670,8 +7508,8 @@
         </p:nvSpPr>
         <p:spPr>
           <a:xfrm>
-            <a:off x="6345384" y="4970981"/>
-            <a:ext cx="938547" cy="667820"/>
+            <a:off x="6258608" y="5013144"/>
+            <a:ext cx="1129510" cy="822757"/>
           </a:xfrm>
           <a:prstGeom prst="rect">
             <a:avLst/>
@@ -7764,7 +7602,7 @@
         </p:nvCxnSpPr>
         <p:spPr>
           <a:xfrm flipV="1">
-            <a:off x="7072744" y="3164379"/>
+            <a:off x="6823363" y="3164379"/>
             <a:ext cx="0" cy="1892530"/>
           </a:xfrm>
           <a:prstGeom prst="line">
@@ -7791,6 +7629,460 @@
           </a:fontRef>
         </p:style>
       </p:cxnSp>
+      <p:sp>
+        <p:nvSpPr>
+          <p:cNvPr id="2" name="Oval 1">
+            <a:extLst>
+              <a:ext uri="{FF2B5EF4-FFF2-40B4-BE49-F238E27FC236}">
+                <a16:creationId xmlns:a16="http://schemas.microsoft.com/office/drawing/2014/main" id="{EF57ED96-394A-DC01-BBC7-E085FF4D4A99}"/>
+              </a:ext>
+            </a:extLst>
+          </p:cNvPr>
+          <p:cNvSpPr/>
+          <p:nvPr/>
+        </p:nvSpPr>
+        <p:spPr>
+          <a:xfrm>
+            <a:off x="3970248" y="3108100"/>
+            <a:ext cx="214746" cy="182589"/>
+          </a:xfrm>
+          <a:prstGeom prst="ellipse">
+            <a:avLst/>
+          </a:prstGeom>
+        </p:spPr>
+        <p:style>
+          <a:lnRef idx="2">
+            <a:schemeClr val="accent3">
+              <a:shade val="15000"/>
+            </a:schemeClr>
+          </a:lnRef>
+          <a:fillRef idx="1">
+            <a:schemeClr val="accent3"/>
+          </a:fillRef>
+          <a:effectRef idx="0">
+            <a:schemeClr val="accent3"/>
+          </a:effectRef>
+          <a:fontRef idx="minor">
+            <a:schemeClr val="lt1"/>
+          </a:fontRef>
+        </p:style>
+        <p:txBody>
+          <a:bodyPr rtlCol="0" anchor="ctr"/>
+          <a:lstStyle/>
+          <a:p>
+            <a:pPr algn="ctr"/>
+            <a:endParaRPr lang="en-US"/>
+          </a:p>
+        </p:txBody>
+      </p:sp>
+      <p:sp>
+        <p:nvSpPr>
+          <p:cNvPr id="7" name="Oval 6">
+            <a:extLst>
+              <a:ext uri="{FF2B5EF4-FFF2-40B4-BE49-F238E27FC236}">
+                <a16:creationId xmlns:a16="http://schemas.microsoft.com/office/drawing/2014/main" id="{A79A8B80-5962-7D0C-066C-314FF216DCA1}"/>
+              </a:ext>
+            </a:extLst>
+          </p:cNvPr>
+          <p:cNvSpPr/>
+          <p:nvPr/>
+        </p:nvSpPr>
+        <p:spPr>
+          <a:xfrm>
+            <a:off x="3970248" y="4395385"/>
+            <a:ext cx="214746" cy="182589"/>
+          </a:xfrm>
+          <a:prstGeom prst="ellipse">
+            <a:avLst/>
+          </a:prstGeom>
+        </p:spPr>
+        <p:style>
+          <a:lnRef idx="2">
+            <a:schemeClr val="accent3">
+              <a:shade val="15000"/>
+            </a:schemeClr>
+          </a:lnRef>
+          <a:fillRef idx="1">
+            <a:schemeClr val="accent3"/>
+          </a:fillRef>
+          <a:effectRef idx="0">
+            <a:schemeClr val="accent3"/>
+          </a:effectRef>
+          <a:fontRef idx="minor">
+            <a:schemeClr val="lt1"/>
+          </a:fontRef>
+        </p:style>
+        <p:txBody>
+          <a:bodyPr rtlCol="0" anchor="ctr"/>
+          <a:lstStyle/>
+          <a:p>
+            <a:pPr algn="ctr"/>
+            <a:endParaRPr lang="en-US"/>
+          </a:p>
+        </p:txBody>
+      </p:sp>
+      <p:sp>
+        <p:nvSpPr>
+          <p:cNvPr id="21" name="Rectangle 20">
+            <a:extLst>
+              <a:ext uri="{FF2B5EF4-FFF2-40B4-BE49-F238E27FC236}">
+                <a16:creationId xmlns:a16="http://schemas.microsoft.com/office/drawing/2014/main" id="{AE8A5F07-837F-8643-3F06-E8C6F80CD913}"/>
+              </a:ext>
+            </a:extLst>
+          </p:cNvPr>
+          <p:cNvSpPr/>
+          <p:nvPr/>
+        </p:nvSpPr>
+        <p:spPr>
+          <a:xfrm>
+            <a:off x="6388915" y="5016990"/>
+            <a:ext cx="266699" cy="222839"/>
+          </a:xfrm>
+          <a:prstGeom prst="rect">
+            <a:avLst/>
+          </a:prstGeom>
+        </p:spPr>
+        <p:style>
+          <a:lnRef idx="2">
+            <a:schemeClr val="accent3">
+              <a:shade val="15000"/>
+            </a:schemeClr>
+          </a:lnRef>
+          <a:fillRef idx="1">
+            <a:schemeClr val="accent3"/>
+          </a:fillRef>
+          <a:effectRef idx="0">
+            <a:schemeClr val="accent3"/>
+          </a:effectRef>
+          <a:fontRef idx="minor">
+            <a:schemeClr val="lt1"/>
+          </a:fontRef>
+        </p:style>
+        <p:txBody>
+          <a:bodyPr rtlCol="0" anchor="ctr"/>
+          <a:lstStyle/>
+          <a:p>
+            <a:pPr algn="ctr"/>
+            <a:endParaRPr lang="en-US" sz="500" dirty="0"/>
+          </a:p>
+        </p:txBody>
+      </p:sp>
+      <p:sp>
+        <p:nvSpPr>
+          <p:cNvPr id="22" name="Rectangle 21">
+            <a:extLst>
+              <a:ext uri="{FF2B5EF4-FFF2-40B4-BE49-F238E27FC236}">
+                <a16:creationId xmlns:a16="http://schemas.microsoft.com/office/drawing/2014/main" id="{1A8BFFF0-5357-8EE1-8FF1-9EE110B58551}"/>
+              </a:ext>
+            </a:extLst>
+          </p:cNvPr>
+          <p:cNvSpPr/>
+          <p:nvPr/>
+        </p:nvSpPr>
+        <p:spPr>
+          <a:xfrm>
+            <a:off x="6690013" y="5016990"/>
+            <a:ext cx="266699" cy="222839"/>
+          </a:xfrm>
+          <a:prstGeom prst="rect">
+            <a:avLst/>
+          </a:prstGeom>
+        </p:spPr>
+        <p:style>
+          <a:lnRef idx="2">
+            <a:schemeClr val="accent3">
+              <a:shade val="15000"/>
+            </a:schemeClr>
+          </a:lnRef>
+          <a:fillRef idx="1">
+            <a:schemeClr val="accent3"/>
+          </a:fillRef>
+          <a:effectRef idx="0">
+            <a:schemeClr val="accent3"/>
+          </a:effectRef>
+          <a:fontRef idx="minor">
+            <a:schemeClr val="lt1"/>
+          </a:fontRef>
+        </p:style>
+        <p:txBody>
+          <a:bodyPr rtlCol="0" anchor="ctr"/>
+          <a:lstStyle/>
+          <a:p>
+            <a:pPr algn="ctr"/>
+            <a:endParaRPr lang="en-US" sz="500" dirty="0"/>
+          </a:p>
+        </p:txBody>
+      </p:sp>
+      <p:sp>
+        <p:nvSpPr>
+          <p:cNvPr id="23" name="Rectangle 22">
+            <a:extLst>
+              <a:ext uri="{FF2B5EF4-FFF2-40B4-BE49-F238E27FC236}">
+                <a16:creationId xmlns:a16="http://schemas.microsoft.com/office/drawing/2014/main" id="{8D78CAE8-6220-4F7E-FE9C-9E2A6A485B19}"/>
+              </a:ext>
+            </a:extLst>
+          </p:cNvPr>
+          <p:cNvSpPr/>
+          <p:nvPr/>
+        </p:nvSpPr>
+        <p:spPr>
+          <a:xfrm>
+            <a:off x="6991111" y="5016990"/>
+            <a:ext cx="266699" cy="222839"/>
+          </a:xfrm>
+          <a:prstGeom prst="rect">
+            <a:avLst/>
+          </a:prstGeom>
+        </p:spPr>
+        <p:style>
+          <a:lnRef idx="2">
+            <a:schemeClr val="accent3">
+              <a:shade val="15000"/>
+            </a:schemeClr>
+          </a:lnRef>
+          <a:fillRef idx="1">
+            <a:schemeClr val="accent3"/>
+          </a:fillRef>
+          <a:effectRef idx="0">
+            <a:schemeClr val="accent3"/>
+          </a:effectRef>
+          <a:fontRef idx="minor">
+            <a:schemeClr val="lt1"/>
+          </a:fontRef>
+        </p:style>
+        <p:txBody>
+          <a:bodyPr rtlCol="0" anchor="ctr"/>
+          <a:lstStyle/>
+          <a:p>
+            <a:pPr algn="ctr"/>
+            <a:endParaRPr lang="en-US" sz="500" dirty="0"/>
+          </a:p>
+        </p:txBody>
+      </p:sp>
+      <p:sp>
+        <p:nvSpPr>
+          <p:cNvPr id="25" name="Oval 24">
+            <a:extLst>
+              <a:ext uri="{FF2B5EF4-FFF2-40B4-BE49-F238E27FC236}">
+                <a16:creationId xmlns:a16="http://schemas.microsoft.com/office/drawing/2014/main" id="{76D984A4-F170-ACD9-6F8A-E0BD9C957C3D}"/>
+              </a:ext>
+            </a:extLst>
+          </p:cNvPr>
+          <p:cNvSpPr/>
+          <p:nvPr/>
+        </p:nvSpPr>
+        <p:spPr>
+          <a:xfrm>
+            <a:off x="6715989" y="3108100"/>
+            <a:ext cx="214746" cy="182589"/>
+          </a:xfrm>
+          <a:prstGeom prst="ellipse">
+            <a:avLst/>
+          </a:prstGeom>
+        </p:spPr>
+        <p:style>
+          <a:lnRef idx="2">
+            <a:schemeClr val="accent3">
+              <a:shade val="15000"/>
+            </a:schemeClr>
+          </a:lnRef>
+          <a:fillRef idx="1">
+            <a:schemeClr val="accent3"/>
+          </a:fillRef>
+          <a:effectRef idx="0">
+            <a:schemeClr val="accent3"/>
+          </a:effectRef>
+          <a:fontRef idx="minor">
+            <a:schemeClr val="lt1"/>
+          </a:fontRef>
+        </p:style>
+        <p:txBody>
+          <a:bodyPr rtlCol="0" anchor="ctr"/>
+          <a:lstStyle/>
+          <a:p>
+            <a:pPr algn="ctr"/>
+            <a:endParaRPr lang="en-US"/>
+          </a:p>
+        </p:txBody>
+      </p:sp>
+      <p:sp>
+        <p:nvSpPr>
+          <p:cNvPr id="26" name="TextBox 25">
+            <a:extLst>
+              <a:ext uri="{FF2B5EF4-FFF2-40B4-BE49-F238E27FC236}">
+                <a16:creationId xmlns:a16="http://schemas.microsoft.com/office/drawing/2014/main" id="{1058C8F5-D777-BB6D-6D1A-0C6BB73957F8}"/>
+              </a:ext>
+            </a:extLst>
+          </p:cNvPr>
+          <p:cNvSpPr txBox="1"/>
+          <p:nvPr/>
+        </p:nvSpPr>
+        <p:spPr>
+          <a:xfrm>
+            <a:off x="6256486" y="5024385"/>
+            <a:ext cx="535368" cy="215444"/>
+          </a:xfrm>
+          <a:prstGeom prst="rect">
+            <a:avLst/>
+          </a:prstGeom>
+          <a:noFill/>
+        </p:spPr>
+        <p:txBody>
+          <a:bodyPr wrap="square" rtlCol="0">
+            <a:spAutoFit/>
+          </a:bodyPr>
+          <a:lstStyle/>
+          <a:p>
+            <a:pPr algn="ctr"/>
+            <a:r>
+              <a:rPr lang="en-US" sz="800" dirty="0">
+                <a:solidFill>
+                  <a:schemeClr val="bg1"/>
+                </a:solidFill>
+              </a:rPr>
+              <a:t>NO</a:t>
+            </a:r>
+            <a:endParaRPr lang="en-US" sz="1050" dirty="0">
+              <a:solidFill>
+                <a:schemeClr val="bg1"/>
+              </a:solidFill>
+            </a:endParaRPr>
+          </a:p>
+        </p:txBody>
+      </p:sp>
+      <p:sp>
+        <p:nvSpPr>
+          <p:cNvPr id="27" name="TextBox 26">
+            <a:extLst>
+              <a:ext uri="{FF2B5EF4-FFF2-40B4-BE49-F238E27FC236}">
+                <a16:creationId xmlns:a16="http://schemas.microsoft.com/office/drawing/2014/main" id="{9957E11C-5D7A-E1E9-DCFD-88ECE93B969D}"/>
+              </a:ext>
+            </a:extLst>
+          </p:cNvPr>
+          <p:cNvSpPr txBox="1"/>
+          <p:nvPr/>
+        </p:nvSpPr>
+        <p:spPr>
+          <a:xfrm>
+            <a:off x="6555678" y="5024385"/>
+            <a:ext cx="535368" cy="215444"/>
+          </a:xfrm>
+          <a:prstGeom prst="rect">
+            <a:avLst/>
+          </a:prstGeom>
+          <a:noFill/>
+        </p:spPr>
+        <p:txBody>
+          <a:bodyPr wrap="square" rtlCol="0">
+            <a:spAutoFit/>
+          </a:bodyPr>
+          <a:lstStyle/>
+          <a:p>
+            <a:pPr algn="ctr"/>
+            <a:r>
+              <a:rPr lang="en-US" sz="800" dirty="0">
+                <a:solidFill>
+                  <a:schemeClr val="bg1"/>
+                </a:solidFill>
+              </a:rPr>
+              <a:t>COM</a:t>
+            </a:r>
+          </a:p>
+        </p:txBody>
+      </p:sp>
+      <p:sp>
+        <p:nvSpPr>
+          <p:cNvPr id="28" name="TextBox 27">
+            <a:extLst>
+              <a:ext uri="{FF2B5EF4-FFF2-40B4-BE49-F238E27FC236}">
+                <a16:creationId xmlns:a16="http://schemas.microsoft.com/office/drawing/2014/main" id="{D1B2254F-1549-2F61-A75C-FEA668EB8CC7}"/>
+              </a:ext>
+            </a:extLst>
+          </p:cNvPr>
+          <p:cNvSpPr txBox="1"/>
+          <p:nvPr/>
+        </p:nvSpPr>
+        <p:spPr>
+          <a:xfrm>
+            <a:off x="6848463" y="5024385"/>
+            <a:ext cx="535368" cy="215444"/>
+          </a:xfrm>
+          <a:prstGeom prst="rect">
+            <a:avLst/>
+          </a:prstGeom>
+          <a:noFill/>
+        </p:spPr>
+        <p:txBody>
+          <a:bodyPr wrap="square" rtlCol="0">
+            <a:spAutoFit/>
+          </a:bodyPr>
+          <a:lstStyle/>
+          <a:p>
+            <a:pPr algn="ctr"/>
+            <a:r>
+              <a:rPr lang="en-US" sz="800" dirty="0">
+                <a:solidFill>
+                  <a:schemeClr val="bg1"/>
+                </a:solidFill>
+              </a:rPr>
+              <a:t>NC</a:t>
+            </a:r>
+            <a:endParaRPr lang="en-US" sz="1050" dirty="0">
+              <a:solidFill>
+                <a:schemeClr val="bg1"/>
+              </a:solidFill>
+            </a:endParaRPr>
+          </a:p>
+        </p:txBody>
+      </p:sp>
+      <p:sp>
+        <p:nvSpPr>
+          <p:cNvPr id="29" name="TextBox 28">
+            <a:extLst>
+              <a:ext uri="{FF2B5EF4-FFF2-40B4-BE49-F238E27FC236}">
+                <a16:creationId xmlns:a16="http://schemas.microsoft.com/office/drawing/2014/main" id="{D459493B-1EE4-387D-96CF-0E1C704EAE6C}"/>
+              </a:ext>
+            </a:extLst>
+          </p:cNvPr>
+          <p:cNvSpPr txBox="1"/>
+          <p:nvPr/>
+        </p:nvSpPr>
+        <p:spPr>
+          <a:xfrm>
+            <a:off x="7483423" y="5024385"/>
+            <a:ext cx="1315138" cy="461665"/>
+          </a:xfrm>
+          <a:prstGeom prst="rect">
+            <a:avLst/>
+          </a:prstGeom>
+          <a:noFill/>
+        </p:spPr>
+        <p:txBody>
+          <a:bodyPr wrap="square" rtlCol="0">
+            <a:spAutoFit/>
+          </a:bodyPr>
+          <a:lstStyle/>
+          <a:p>
+            <a:r>
+              <a:rPr lang="en-US" sz="800" dirty="0"/>
+              <a:t>NO = normally open</a:t>
+            </a:r>
+          </a:p>
+          <a:p>
+            <a:r>
+              <a:rPr lang="en-US" sz="800" dirty="0"/>
+              <a:t>COM = common</a:t>
+            </a:r>
+          </a:p>
+          <a:p>
+            <a:r>
+              <a:rPr lang="en-US" sz="800" dirty="0"/>
+              <a:t>NC = normally closed</a:t>
+            </a:r>
+            <a:endParaRPr lang="en-US" sz="500" dirty="0"/>
+          </a:p>
+        </p:txBody>
+      </p:sp>
     </p:spTree>
     <p:extLst>
       <p:ext uri="{BB962C8B-B14F-4D97-AF65-F5344CB8AC3E}">

</xml_diff>